<commit_message>
Adding Columns To Existing Tables Using Migration
</commit_message>
<xml_diff>
--- a/.lessons/15 Fundamental Database - Migration and Seeding/5 Adding Columns To Existing Tables Using Migration/1.pptx
+++ b/.lessons/15 Fundamental Database - Migration and Seeding/5 Adding Columns To Existing Tables Using Migration/1.pptx
@@ -7,6 +7,8 @@
   <p:sldIdLst>
     <p:sldId id="385" r:id="rId2"/>
     <p:sldId id="386" r:id="rId3"/>
+    <p:sldId id="387" r:id="rId4"/>
+    <p:sldId id="388" r:id="rId5"/>
   </p:sldIdLst>
   <p:sldSz cx="12192000" cy="6858000"/>
   <p:notesSz cx="6858000" cy="9144000"/>
@@ -260,7 +262,7 @@
           <a:p>
             <a:fld id="{3E102D2E-813C-461C-9963-687A650C48C0}" type="datetimeFigureOut">
               <a:rPr lang="en-US" smtClean="0"/>
-              <a:t>4/21/2025</a:t>
+              <a:t>4/22/2025</a:t>
             </a:fld>
             <a:endParaRPr lang="en-US"/>
           </a:p>
@@ -458,7 +460,7 @@
           <a:p>
             <a:fld id="{3E102D2E-813C-461C-9963-687A650C48C0}" type="datetimeFigureOut">
               <a:rPr lang="en-US" smtClean="0"/>
-              <a:t>4/21/2025</a:t>
+              <a:t>4/22/2025</a:t>
             </a:fld>
             <a:endParaRPr lang="en-US"/>
           </a:p>
@@ -666,7 +668,7 @@
           <a:p>
             <a:fld id="{3E102D2E-813C-461C-9963-687A650C48C0}" type="datetimeFigureOut">
               <a:rPr lang="en-US" smtClean="0"/>
-              <a:t>4/21/2025</a:t>
+              <a:t>4/22/2025</a:t>
             </a:fld>
             <a:endParaRPr lang="en-US"/>
           </a:p>
@@ -864,7 +866,7 @@
           <a:p>
             <a:fld id="{3E102D2E-813C-461C-9963-687A650C48C0}" type="datetimeFigureOut">
               <a:rPr lang="en-US" smtClean="0"/>
-              <a:t>4/21/2025</a:t>
+              <a:t>4/22/2025</a:t>
             </a:fld>
             <a:endParaRPr lang="en-US"/>
           </a:p>
@@ -1139,7 +1141,7 @@
           <a:p>
             <a:fld id="{3E102D2E-813C-461C-9963-687A650C48C0}" type="datetimeFigureOut">
               <a:rPr lang="en-US" smtClean="0"/>
-              <a:t>4/21/2025</a:t>
+              <a:t>4/22/2025</a:t>
             </a:fld>
             <a:endParaRPr lang="en-US"/>
           </a:p>
@@ -1404,7 +1406,7 @@
           <a:p>
             <a:fld id="{3E102D2E-813C-461C-9963-687A650C48C0}" type="datetimeFigureOut">
               <a:rPr lang="en-US" smtClean="0"/>
-              <a:t>4/21/2025</a:t>
+              <a:t>4/22/2025</a:t>
             </a:fld>
             <a:endParaRPr lang="en-US"/>
           </a:p>
@@ -1816,7 +1818,7 @@
           <a:p>
             <a:fld id="{3E102D2E-813C-461C-9963-687A650C48C0}" type="datetimeFigureOut">
               <a:rPr lang="en-US" smtClean="0"/>
-              <a:t>4/21/2025</a:t>
+              <a:t>4/22/2025</a:t>
             </a:fld>
             <a:endParaRPr lang="en-US"/>
           </a:p>
@@ -1957,7 +1959,7 @@
           <a:p>
             <a:fld id="{3E102D2E-813C-461C-9963-687A650C48C0}" type="datetimeFigureOut">
               <a:rPr lang="en-US" smtClean="0"/>
-              <a:t>4/21/2025</a:t>
+              <a:t>4/22/2025</a:t>
             </a:fld>
             <a:endParaRPr lang="en-US"/>
           </a:p>
@@ -2070,7 +2072,7 @@
           <a:p>
             <a:fld id="{3E102D2E-813C-461C-9963-687A650C48C0}" type="datetimeFigureOut">
               <a:rPr lang="en-US" smtClean="0"/>
-              <a:t>4/21/2025</a:t>
+              <a:t>4/22/2025</a:t>
             </a:fld>
             <a:endParaRPr lang="en-US"/>
           </a:p>
@@ -2381,7 +2383,7 @@
           <a:p>
             <a:fld id="{3E102D2E-813C-461C-9963-687A650C48C0}" type="datetimeFigureOut">
               <a:rPr lang="en-US" smtClean="0"/>
-              <a:t>4/21/2025</a:t>
+              <a:t>4/22/2025</a:t>
             </a:fld>
             <a:endParaRPr lang="en-US"/>
           </a:p>
@@ -2669,7 +2671,7 @@
           <a:p>
             <a:fld id="{3E102D2E-813C-461C-9963-687A650C48C0}" type="datetimeFigureOut">
               <a:rPr lang="en-US" smtClean="0"/>
-              <a:t>4/21/2025</a:t>
+              <a:t>4/22/2025</a:t>
             </a:fld>
             <a:endParaRPr lang="en-US"/>
           </a:p>
@@ -2910,7 +2912,7 @@
           <a:p>
             <a:fld id="{3E102D2E-813C-461C-9963-687A650C48C0}" type="datetimeFigureOut">
               <a:rPr lang="en-US" smtClean="0"/>
-              <a:t>4/21/2025</a:t>
+              <a:t>4/22/2025</a:t>
             </a:fld>
             <a:endParaRPr lang="en-US"/>
           </a:p>
@@ -3348,7 +3350,7 @@
         <p:spPr>
           <a:xfrm>
             <a:off x="217714" y="255046"/>
-            <a:ext cx="11756571" cy="355354"/>
+            <a:ext cx="11756571" cy="3356175"/>
           </a:xfrm>
           <a:prstGeom prst="rect">
             <a:avLst/>
@@ -3368,6 +3370,19 @@
               <a:buNone/>
             </a:pPr>
             <a:r>
+              <a:rPr kumimoji="0" lang="az-Latn-AZ" altLang="en-US" sz="1300" b="0" i="0" u="none" strike="noStrike" cap="none" normalizeH="0" baseline="0">
+                <a:ln>
+                  <a:noFill/>
+                </a:ln>
+                <a:solidFill>
+                  <a:schemeClr val="tx1"/>
+                </a:solidFill>
+                <a:effectLst/>
+                <a:latin typeface="Arial" panose="020B0604020202020204" pitchFamily="34" charset="0"/>
+              </a:rPr>
+              <a:t>Bu dərs </a:t>
+            </a:r>
+            <a:r>
               <a:rPr kumimoji="0" lang="en-US" altLang="en-US" sz="1300" b="0" i="0" u="none" strike="noStrike" cap="none" normalizeH="0" baseline="0">
                 <a:ln>
                   <a:noFill/>
@@ -3378,7 +3393,465 @@
                 <a:effectLst/>
                 <a:latin typeface="Arial" panose="020B0604020202020204" pitchFamily="34" charset="0"/>
               </a:rPr>
-              <a:t>.</a:t>
+              <a:t>artıq mövcud olan </a:t>
+            </a:r>
+            <a:r>
+              <a:rPr kumimoji="0" lang="en-US" altLang="en-US" sz="1300" b="1" i="0" u="none" strike="noStrike" cap="none" normalizeH="0" baseline="0">
+                <a:ln>
+                  <a:noFill/>
+                </a:ln>
+                <a:solidFill>
+                  <a:srgbClr val="0070C0"/>
+                </a:solidFill>
+                <a:effectLst/>
+                <a:latin typeface="Arial" panose="020B0604020202020204" pitchFamily="34" charset="0"/>
+              </a:rPr>
+              <a:t>posts</a:t>
+            </a:r>
+            <a:r>
+              <a:rPr kumimoji="0" lang="en-US" altLang="en-US" sz="1300" b="0" i="0" u="none" strike="noStrike" cap="none" normalizeH="0" baseline="0">
+                <a:ln>
+                  <a:noFill/>
+                </a:ln>
+                <a:solidFill>
+                  <a:schemeClr val="tx1"/>
+                </a:solidFill>
+                <a:effectLst/>
+                <a:latin typeface="Arial" panose="020B0604020202020204" pitchFamily="34" charset="0"/>
+              </a:rPr>
+              <a:t> cədvəlinə dəyişikliklər əlavə etmək üçün </a:t>
+            </a:r>
+            <a:r>
+              <a:rPr kumimoji="0" lang="az-Latn-AZ" altLang="en-US" sz="1300" b="0" i="0" u="none" strike="noStrike" cap="none" normalizeH="0" baseline="0">
+                <a:ln>
+                  <a:noFill/>
+                </a:ln>
+                <a:solidFill>
+                  <a:schemeClr val="tx1"/>
+                </a:solidFill>
+                <a:effectLst/>
+                <a:latin typeface="Arial" panose="020B0604020202020204" pitchFamily="34" charset="0"/>
+              </a:rPr>
+              <a:t>necə </a:t>
+            </a:r>
+            <a:r>
+              <a:rPr kumimoji="0" lang="en-US" altLang="en-US" sz="1300" b="1" i="0" u="none" strike="noStrike" cap="none" normalizeH="0" baseline="0">
+                <a:ln>
+                  <a:noFill/>
+                </a:ln>
+                <a:solidFill>
+                  <a:srgbClr val="0070C0"/>
+                </a:solidFill>
+                <a:effectLst/>
+                <a:latin typeface="Arial" panose="020B0604020202020204" pitchFamily="34" charset="0"/>
+              </a:rPr>
+              <a:t>migration</a:t>
+            </a:r>
+            <a:r>
+              <a:rPr kumimoji="0" lang="en-US" altLang="en-US" sz="1300" b="0" i="0" u="none" strike="noStrike" cap="none" normalizeH="0" baseline="0">
+                <a:ln>
+                  <a:noFill/>
+                </a:ln>
+                <a:solidFill>
+                  <a:schemeClr val="tx1"/>
+                </a:solidFill>
+                <a:effectLst/>
+                <a:latin typeface="Arial" panose="020B0604020202020204" pitchFamily="34" charset="0"/>
+              </a:rPr>
+              <a:t> yaratmaq </a:t>
+            </a:r>
+            <a:r>
+              <a:rPr kumimoji="0" lang="az-Latn-AZ" altLang="en-US" sz="1300" b="0" i="0" u="none" strike="noStrike" cap="none" normalizeH="0" baseline="0">
+                <a:ln>
+                  <a:noFill/>
+                </a:ln>
+                <a:solidFill>
+                  <a:schemeClr val="tx1"/>
+                </a:solidFill>
+                <a:effectLst/>
+                <a:latin typeface="Arial" panose="020B0604020202020204" pitchFamily="34" charset="0"/>
+              </a:rPr>
+              <a:t>olar onu görəcəyik.</a:t>
+            </a:r>
+          </a:p>
+          <a:p>
+            <a:pPr>
+              <a:lnSpc>
+                <a:spcPct val="150000"/>
+              </a:lnSpc>
+              <a:buNone/>
+            </a:pPr>
+            <a:endParaRPr lang="az-Latn-AZ" altLang="en-US" sz="1300">
+              <a:latin typeface="Arial" panose="020B0604020202020204" pitchFamily="34" charset="0"/>
+            </a:endParaRPr>
+          </a:p>
+          <a:p>
+            <a:pPr>
+              <a:lnSpc>
+                <a:spcPct val="150000"/>
+              </a:lnSpc>
+              <a:buNone/>
+            </a:pPr>
+            <a:endParaRPr kumimoji="0" lang="az-Latn-AZ" altLang="en-US" sz="1300" b="0" i="0" u="none" strike="noStrike" cap="none" normalizeH="0" baseline="0">
+              <a:ln>
+                <a:noFill/>
+              </a:ln>
+              <a:solidFill>
+                <a:schemeClr val="tx1"/>
+              </a:solidFill>
+              <a:effectLst/>
+              <a:latin typeface="Arial" panose="020B0604020202020204" pitchFamily="34" charset="0"/>
+            </a:endParaRPr>
+          </a:p>
+          <a:p>
+            <a:pPr>
+              <a:lnSpc>
+                <a:spcPct val="150000"/>
+              </a:lnSpc>
+              <a:buNone/>
+            </a:pPr>
+            <a:r>
+              <a:rPr kumimoji="0" lang="en-US" altLang="en-US" sz="1300" b="0" i="0" u="none" strike="noStrike" cap="none" normalizeH="0" baseline="0">
+                <a:ln>
+                  <a:noFill/>
+                </a:ln>
+                <a:solidFill>
+                  <a:schemeClr val="tx1"/>
+                </a:solidFill>
+                <a:effectLst/>
+                <a:latin typeface="Arial" panose="020B0604020202020204" pitchFamily="34" charset="0"/>
+              </a:rPr>
+              <a:t>✅ 1) </a:t>
+            </a:r>
+            <a:r>
+              <a:rPr kumimoji="0" lang="en-US" altLang="en-US" sz="1300" b="1" i="0" u="none" strike="noStrike" cap="none" normalizeH="0" baseline="0">
+                <a:ln>
+                  <a:noFill/>
+                </a:ln>
+                <a:solidFill>
+                  <a:srgbClr val="FF0000"/>
+                </a:solidFill>
+                <a:effectLst/>
+                <a:latin typeface="Arial" panose="020B0604020202020204" pitchFamily="34" charset="0"/>
+              </a:rPr>
+              <a:t>php artisan make:migration add_posts_table --table=posts </a:t>
+            </a:r>
+            <a:endParaRPr kumimoji="0" lang="az-Latn-AZ" altLang="en-US" sz="1300" b="1" i="0" u="none" strike="noStrike" cap="none" normalizeH="0" baseline="0">
+              <a:ln>
+                <a:noFill/>
+              </a:ln>
+              <a:solidFill>
+                <a:srgbClr val="FF0000"/>
+              </a:solidFill>
+              <a:effectLst/>
+              <a:latin typeface="Arial" panose="020B0604020202020204" pitchFamily="34" charset="0"/>
+            </a:endParaRPr>
+          </a:p>
+          <a:p>
+            <a:pPr>
+              <a:lnSpc>
+                <a:spcPct val="150000"/>
+              </a:lnSpc>
+              <a:buNone/>
+            </a:pPr>
+            <a:r>
+              <a:rPr kumimoji="0" lang="en-US" altLang="en-US" sz="1300" b="0" i="0" u="none" strike="noStrike" cap="none" normalizeH="0" baseline="0">
+                <a:ln>
+                  <a:noFill/>
+                </a:ln>
+                <a:solidFill>
+                  <a:schemeClr val="tx1"/>
+                </a:solidFill>
+                <a:effectLst/>
+                <a:latin typeface="Arial" panose="020B0604020202020204" pitchFamily="34" charset="0"/>
+              </a:rPr>
+              <a:t>Bu əmr Laravel-də mövcud bir cədvələ dəyişikliklər əlavə etmək üçün </a:t>
+            </a:r>
+            <a:r>
+              <a:rPr kumimoji="0" lang="en-US" altLang="en-US" sz="1300" b="1" i="0" u="none" strike="noStrike" cap="none" normalizeH="0" baseline="0">
+                <a:ln>
+                  <a:noFill/>
+                </a:ln>
+                <a:solidFill>
+                  <a:schemeClr val="tx1"/>
+                </a:solidFill>
+                <a:effectLst/>
+                <a:latin typeface="Arial" panose="020B0604020202020204" pitchFamily="34" charset="0"/>
+              </a:rPr>
+              <a:t>yeni</a:t>
+            </a:r>
+            <a:r>
+              <a:rPr kumimoji="0" lang="en-US" altLang="en-US" sz="1300" b="0" i="0" u="none" strike="noStrike" cap="none" normalizeH="0" baseline="0">
+                <a:ln>
+                  <a:noFill/>
+                </a:ln>
+                <a:solidFill>
+                  <a:schemeClr val="tx1"/>
+                </a:solidFill>
+                <a:effectLst/>
+                <a:latin typeface="Arial" panose="020B0604020202020204" pitchFamily="34" charset="0"/>
+              </a:rPr>
+              <a:t> bir migration faylı yaradır.</a:t>
+            </a:r>
+          </a:p>
+          <a:p>
+            <a:pPr>
+              <a:lnSpc>
+                <a:spcPct val="150000"/>
+              </a:lnSpc>
+              <a:buNone/>
+            </a:pPr>
+            <a:endParaRPr kumimoji="0" lang="en-US" altLang="en-US" sz="1300" b="0" i="0" u="none" strike="noStrike" cap="none" normalizeH="0" baseline="0">
+              <a:ln>
+                <a:noFill/>
+              </a:ln>
+              <a:solidFill>
+                <a:schemeClr val="tx1"/>
+              </a:solidFill>
+              <a:effectLst/>
+              <a:latin typeface="Arial" panose="020B0604020202020204" pitchFamily="34" charset="0"/>
+            </a:endParaRPr>
+          </a:p>
+          <a:p>
+            <a:pPr>
+              <a:lnSpc>
+                <a:spcPct val="150000"/>
+              </a:lnSpc>
+              <a:buNone/>
+            </a:pPr>
+            <a:r>
+              <a:rPr kumimoji="0" lang="en-US" altLang="en-US" sz="1300" b="1" i="0" u="none" strike="noStrike" cap="none" normalizeH="0" baseline="0">
+                <a:ln>
+                  <a:noFill/>
+                </a:ln>
+                <a:solidFill>
+                  <a:schemeClr val="tx1"/>
+                </a:solidFill>
+                <a:effectLst/>
+                <a:latin typeface="Arial" panose="020B0604020202020204" pitchFamily="34" charset="0"/>
+              </a:rPr>
+              <a:t>Bu əmrlə</a:t>
+            </a:r>
+            <a:r>
+              <a:rPr kumimoji="0" lang="en-US" altLang="en-US" sz="1300" b="0" i="0" u="none" strike="noStrike" cap="none" normalizeH="0" baseline="0">
+                <a:ln>
+                  <a:noFill/>
+                </a:ln>
+                <a:solidFill>
+                  <a:schemeClr val="tx1"/>
+                </a:solidFill>
+                <a:effectLst/>
+                <a:latin typeface="Arial" panose="020B0604020202020204" pitchFamily="34" charset="0"/>
+              </a:rPr>
+              <a:t>:</a:t>
+            </a:r>
+            <a:r>
+              <a:rPr kumimoji="0" lang="az-Latn-AZ" altLang="en-US" sz="1300" b="0" i="0" u="none" strike="noStrike" cap="none" normalizeH="0" baseline="0">
+                <a:ln>
+                  <a:noFill/>
+                </a:ln>
+                <a:solidFill>
+                  <a:schemeClr val="tx1"/>
+                </a:solidFill>
+                <a:effectLst/>
+                <a:latin typeface="Arial" panose="020B0604020202020204" pitchFamily="34" charset="0"/>
+              </a:rPr>
+              <a:t> </a:t>
+            </a:r>
+            <a:r>
+              <a:rPr kumimoji="0" lang="en-US" altLang="en-US" sz="1300" b="1" i="0" u="none" strike="noStrike" cap="none" normalizeH="0" baseline="0">
+                <a:ln>
+                  <a:noFill/>
+                </a:ln>
+                <a:solidFill>
+                  <a:srgbClr val="00B050"/>
+                </a:solidFill>
+                <a:effectLst/>
+                <a:latin typeface="Arial" panose="020B0604020202020204" pitchFamily="34" charset="0"/>
+              </a:rPr>
+              <a:t>database/migrations/ </a:t>
+            </a:r>
+            <a:r>
+              <a:rPr kumimoji="0" lang="en-US" altLang="en-US" sz="1300" b="0" i="0" u="none" strike="noStrike" cap="none" normalizeH="0" baseline="0">
+                <a:ln>
+                  <a:noFill/>
+                </a:ln>
+                <a:solidFill>
+                  <a:schemeClr val="tx1"/>
+                </a:solidFill>
+                <a:effectLst/>
+                <a:latin typeface="Arial" panose="020B0604020202020204" pitchFamily="34" charset="0"/>
+              </a:rPr>
+              <a:t>qovluğunda yeni bir fayl yaradılır (adətən </a:t>
+            </a:r>
+            <a:r>
+              <a:rPr kumimoji="0" lang="en-US" altLang="en-US" sz="1300" b="1" i="0" u="none" strike="noStrike" cap="none" normalizeH="0" baseline="0">
+                <a:ln>
+                  <a:noFill/>
+                </a:ln>
+                <a:solidFill>
+                  <a:srgbClr val="0070C0"/>
+                </a:solidFill>
+                <a:effectLst/>
+                <a:latin typeface="Arial" panose="020B0604020202020204" pitchFamily="34" charset="0"/>
+              </a:rPr>
+              <a:t>add_..._to_..._table </a:t>
+            </a:r>
+            <a:r>
+              <a:rPr kumimoji="0" lang="en-US" altLang="en-US" sz="1300" b="0" i="0" u="none" strike="noStrike" cap="none" normalizeH="0" baseline="0">
+                <a:ln>
+                  <a:noFill/>
+                </a:ln>
+                <a:solidFill>
+                  <a:schemeClr val="tx1"/>
+                </a:solidFill>
+                <a:effectLst/>
+                <a:latin typeface="Arial" panose="020B0604020202020204" pitchFamily="34" charset="0"/>
+              </a:rPr>
+              <a:t>formatında).</a:t>
+            </a:r>
+          </a:p>
+          <a:p>
+            <a:pPr>
+              <a:lnSpc>
+                <a:spcPct val="150000"/>
+              </a:lnSpc>
+              <a:buNone/>
+            </a:pPr>
+            <a:endParaRPr kumimoji="0" lang="en-US" altLang="en-US" sz="1300" b="0" i="0" u="none" strike="noStrike" cap="none" normalizeH="0" baseline="0">
+              <a:ln>
+                <a:noFill/>
+              </a:ln>
+              <a:solidFill>
+                <a:schemeClr val="tx1"/>
+              </a:solidFill>
+              <a:effectLst/>
+              <a:latin typeface="Arial" panose="020B0604020202020204" pitchFamily="34" charset="0"/>
+            </a:endParaRPr>
+          </a:p>
+          <a:p>
+            <a:pPr>
+              <a:lnSpc>
+                <a:spcPct val="150000"/>
+              </a:lnSpc>
+              <a:buNone/>
+            </a:pPr>
+            <a:r>
+              <a:rPr kumimoji="0" lang="en-US" altLang="en-US" sz="1300" b="1" i="0" u="none" strike="noStrike" cap="none" normalizeH="0" baseline="0">
+                <a:ln>
+                  <a:noFill/>
+                </a:ln>
+                <a:solidFill>
+                  <a:srgbClr val="FF0000"/>
+                </a:solidFill>
+                <a:effectLst/>
+                <a:latin typeface="Arial" panose="020B0604020202020204" pitchFamily="34" charset="0"/>
+              </a:rPr>
+              <a:t>--table=posts </a:t>
+            </a:r>
+            <a:r>
+              <a:rPr kumimoji="0" lang="en-US" altLang="en-US" sz="1300" b="0" i="0" u="none" strike="noStrike" cap="none" normalizeH="0" baseline="0">
+                <a:ln>
+                  <a:noFill/>
+                </a:ln>
+                <a:solidFill>
+                  <a:schemeClr val="tx1"/>
+                </a:solidFill>
+                <a:effectLst/>
+                <a:latin typeface="Arial" panose="020B0604020202020204" pitchFamily="34" charset="0"/>
+              </a:rPr>
+              <a:t>flag-i Laravel-ə bildirir ki, bu migration </a:t>
+            </a:r>
+            <a:r>
+              <a:rPr kumimoji="0" lang="en-US" altLang="en-US" sz="1300" b="1" i="0" u="none" strike="noStrike" cap="none" normalizeH="0" baseline="0">
+                <a:ln>
+                  <a:noFill/>
+                </a:ln>
+                <a:solidFill>
+                  <a:schemeClr val="tx1"/>
+                </a:solidFill>
+                <a:effectLst/>
+                <a:latin typeface="Arial" panose="020B0604020202020204" pitchFamily="34" charset="0"/>
+              </a:rPr>
+              <a:t>mövcud posts </a:t>
+            </a:r>
+            <a:r>
+              <a:rPr kumimoji="0" lang="en-US" altLang="en-US" sz="1300" b="0" i="0" u="none" strike="noStrike" cap="none" normalizeH="0" baseline="0">
+                <a:ln>
+                  <a:noFill/>
+                </a:ln>
+                <a:solidFill>
+                  <a:schemeClr val="tx1"/>
+                </a:solidFill>
+                <a:effectLst/>
+                <a:latin typeface="Arial" panose="020B0604020202020204" pitchFamily="34" charset="0"/>
+              </a:rPr>
+              <a:t>cədvəlinə aiddir.</a:t>
+            </a:r>
+          </a:p>
+          <a:p>
+            <a:pPr>
+              <a:lnSpc>
+                <a:spcPct val="150000"/>
+              </a:lnSpc>
+              <a:buNone/>
+            </a:pPr>
+            <a:endParaRPr kumimoji="0" lang="en-US" altLang="en-US" sz="1300" b="0" i="0" u="none" strike="noStrike" cap="none" normalizeH="0" baseline="0">
+              <a:ln>
+                <a:noFill/>
+              </a:ln>
+              <a:solidFill>
+                <a:schemeClr val="tx1"/>
+              </a:solidFill>
+              <a:effectLst/>
+              <a:latin typeface="Arial" panose="020B0604020202020204" pitchFamily="34" charset="0"/>
+            </a:endParaRPr>
+          </a:p>
+          <a:p>
+            <a:pPr>
+              <a:lnSpc>
+                <a:spcPct val="150000"/>
+              </a:lnSpc>
+              <a:buNone/>
+            </a:pPr>
+            <a:r>
+              <a:rPr kumimoji="0" lang="en-US" altLang="en-US" sz="1300" b="0" i="0" u="none" strike="noStrike" cap="none" normalizeH="0" baseline="0">
+                <a:ln>
+                  <a:noFill/>
+                </a:ln>
+                <a:solidFill>
+                  <a:schemeClr val="tx1"/>
+                </a:solidFill>
+                <a:effectLst/>
+                <a:latin typeface="Arial" panose="020B0604020202020204" pitchFamily="34" charset="0"/>
+              </a:rPr>
+              <a:t>Laravel </a:t>
+            </a:r>
+            <a:r>
+              <a:rPr kumimoji="0" lang="en-US" altLang="en-US" sz="1300" b="1" i="0" u="none" strike="noStrike" cap="none" normalizeH="0" baseline="0">
+                <a:ln>
+                  <a:noFill/>
+                </a:ln>
+                <a:solidFill>
+                  <a:schemeClr val="tx1"/>
+                </a:solidFill>
+                <a:effectLst/>
+                <a:latin typeface="Arial" panose="020B0604020202020204" pitchFamily="34" charset="0"/>
+              </a:rPr>
+              <a:t>Schema::table() </a:t>
+            </a:r>
+            <a:r>
+              <a:rPr kumimoji="0" lang="en-US" altLang="en-US" sz="1300" b="0" i="0" u="none" strike="noStrike" cap="none" normalizeH="0" baseline="0">
+                <a:ln>
+                  <a:noFill/>
+                </a:ln>
+                <a:solidFill>
+                  <a:schemeClr val="tx1"/>
+                </a:solidFill>
+                <a:effectLst/>
+                <a:latin typeface="Arial" panose="020B0604020202020204" pitchFamily="34" charset="0"/>
+              </a:rPr>
+              <a:t>metodunu istifadə edəcək formada şablon (template) yaradır.</a:t>
             </a:r>
           </a:p>
         </p:txBody>
@@ -3434,6 +3907,463 @@
         <p:spPr>
           <a:xfrm>
             <a:off x="217714" y="255046"/>
+            <a:ext cx="11756571" cy="3356175"/>
+          </a:xfrm>
+          <a:prstGeom prst="rect">
+            <a:avLst/>
+          </a:prstGeom>
+          <a:noFill/>
+        </p:spPr>
+        <p:txBody>
+          <a:bodyPr wrap="square">
+            <a:spAutoFit/>
+          </a:bodyPr>
+          <a:lstStyle/>
+          <a:p>
+            <a:pPr>
+              <a:lnSpc>
+                <a:spcPct val="150000"/>
+              </a:lnSpc>
+              <a:buNone/>
+            </a:pPr>
+            <a:r>
+              <a:rPr kumimoji="0" lang="en-US" altLang="en-US" sz="1300" b="0" i="0" u="none" strike="noStrike" cap="none" normalizeH="0" baseline="0">
+                <a:ln>
+                  <a:noFill/>
+                </a:ln>
+                <a:solidFill>
+                  <a:schemeClr val="tx1"/>
+                </a:solidFill>
+                <a:effectLst/>
+                <a:latin typeface="Arial" panose="020B0604020202020204" pitchFamily="34" charset="0"/>
+              </a:rPr>
+              <a:t>❓ Bu əmr nə zaman istifadə olunur?</a:t>
+            </a:r>
+            <a:endParaRPr kumimoji="0" lang="az-Latn-AZ" altLang="en-US" sz="1300" b="0" i="0" u="none" strike="noStrike" cap="none" normalizeH="0" baseline="0">
+              <a:ln>
+                <a:noFill/>
+              </a:ln>
+              <a:solidFill>
+                <a:schemeClr val="tx1"/>
+              </a:solidFill>
+              <a:effectLst/>
+              <a:latin typeface="Arial" panose="020B0604020202020204" pitchFamily="34" charset="0"/>
+            </a:endParaRPr>
+          </a:p>
+          <a:p>
+            <a:pPr>
+              <a:lnSpc>
+                <a:spcPct val="150000"/>
+              </a:lnSpc>
+              <a:buNone/>
+            </a:pPr>
+            <a:endParaRPr kumimoji="0" lang="en-US" altLang="en-US" sz="1300" b="0" i="0" u="none" strike="noStrike" cap="none" normalizeH="0" baseline="0">
+              <a:ln>
+                <a:noFill/>
+              </a:ln>
+              <a:solidFill>
+                <a:schemeClr val="tx1"/>
+              </a:solidFill>
+              <a:effectLst/>
+              <a:latin typeface="Arial" panose="020B0604020202020204" pitchFamily="34" charset="0"/>
+            </a:endParaRPr>
+          </a:p>
+          <a:p>
+            <a:pPr>
+              <a:lnSpc>
+                <a:spcPct val="150000"/>
+              </a:lnSpc>
+              <a:buNone/>
+            </a:pPr>
+            <a:r>
+              <a:rPr kumimoji="0" lang="en-US" altLang="en-US" sz="1300" b="0" i="0" u="none" strike="noStrike" cap="none" normalizeH="0" baseline="0">
+                <a:ln>
+                  <a:noFill/>
+                </a:ln>
+                <a:solidFill>
+                  <a:schemeClr val="tx1"/>
+                </a:solidFill>
+                <a:effectLst/>
+                <a:latin typeface="Arial" panose="020B0604020202020204" pitchFamily="34" charset="0"/>
+              </a:rPr>
+              <a:t>Yeni cədvəl yaratmaq istəmirsinizsə, sadəcə </a:t>
+            </a:r>
+            <a:r>
+              <a:rPr kumimoji="0" lang="en-US" altLang="en-US" sz="1300" b="1" i="0" u="none" strike="noStrike" cap="none" normalizeH="0" baseline="0">
+                <a:ln>
+                  <a:noFill/>
+                </a:ln>
+                <a:solidFill>
+                  <a:schemeClr val="tx1"/>
+                </a:solidFill>
+                <a:effectLst/>
+                <a:latin typeface="Arial" panose="020B0604020202020204" pitchFamily="34" charset="0"/>
+              </a:rPr>
+              <a:t>posts</a:t>
+            </a:r>
+            <a:r>
+              <a:rPr kumimoji="0" lang="en-US" altLang="en-US" sz="1300" b="0" i="0" u="none" strike="noStrike" cap="none" normalizeH="0" baseline="0">
+                <a:ln>
+                  <a:noFill/>
+                </a:ln>
+                <a:solidFill>
+                  <a:schemeClr val="tx1"/>
+                </a:solidFill>
+                <a:effectLst/>
+                <a:latin typeface="Arial" panose="020B0604020202020204" pitchFamily="34" charset="0"/>
+              </a:rPr>
+              <a:t> cədvəlinə:</a:t>
+            </a:r>
+          </a:p>
+          <a:p>
+            <a:pPr marL="285750" indent="-285750">
+              <a:lnSpc>
+                <a:spcPct val="150000"/>
+              </a:lnSpc>
+              <a:buFont typeface="Wingdings" panose="05000000000000000000" pitchFamily="2" charset="2"/>
+              <a:buChar char="q"/>
+            </a:pPr>
+            <a:r>
+              <a:rPr kumimoji="0" lang="en-US" altLang="en-US" sz="1300" b="0" i="0" u="none" strike="noStrike" cap="none" normalizeH="0" baseline="0">
+                <a:ln>
+                  <a:noFill/>
+                </a:ln>
+                <a:solidFill>
+                  <a:schemeClr val="tx1"/>
+                </a:solidFill>
+                <a:effectLst/>
+                <a:latin typeface="Arial" panose="020B0604020202020204" pitchFamily="34" charset="0"/>
+              </a:rPr>
+              <a:t>Yeni sütun əlavə etmək</a:t>
+            </a:r>
+          </a:p>
+          <a:p>
+            <a:pPr marL="285750" indent="-285750">
+              <a:lnSpc>
+                <a:spcPct val="150000"/>
+              </a:lnSpc>
+              <a:buFont typeface="Wingdings" panose="05000000000000000000" pitchFamily="2" charset="2"/>
+              <a:buChar char="q"/>
+            </a:pPr>
+            <a:r>
+              <a:rPr kumimoji="0" lang="en-US" altLang="en-US" sz="1300" b="0" i="0" u="none" strike="noStrike" cap="none" normalizeH="0" baseline="0">
+                <a:ln>
+                  <a:noFill/>
+                </a:ln>
+                <a:solidFill>
+                  <a:schemeClr val="tx1"/>
+                </a:solidFill>
+                <a:effectLst/>
+                <a:latin typeface="Arial" panose="020B0604020202020204" pitchFamily="34" charset="0"/>
+              </a:rPr>
+              <a:t>Sütun tipini dəyişmək</a:t>
+            </a:r>
+          </a:p>
+          <a:p>
+            <a:pPr marL="285750" indent="-285750">
+              <a:lnSpc>
+                <a:spcPct val="150000"/>
+              </a:lnSpc>
+              <a:buFont typeface="Wingdings" panose="05000000000000000000" pitchFamily="2" charset="2"/>
+              <a:buChar char="q"/>
+            </a:pPr>
+            <a:r>
+              <a:rPr kumimoji="0" lang="en-US" altLang="en-US" sz="1300" b="0" i="0" u="none" strike="noStrike" cap="none" normalizeH="0" baseline="0">
+                <a:ln>
+                  <a:noFill/>
+                </a:ln>
+                <a:solidFill>
+                  <a:schemeClr val="tx1"/>
+                </a:solidFill>
+                <a:effectLst/>
+                <a:latin typeface="Arial" panose="020B0604020202020204" pitchFamily="34" charset="0"/>
+              </a:rPr>
+              <a:t>Yeni indeks, foreign key əlavə etmək</a:t>
+            </a:r>
+          </a:p>
+          <a:p>
+            <a:pPr marL="285750" indent="-285750">
+              <a:lnSpc>
+                <a:spcPct val="150000"/>
+              </a:lnSpc>
+              <a:buFont typeface="Wingdings" panose="05000000000000000000" pitchFamily="2" charset="2"/>
+              <a:buChar char="q"/>
+            </a:pPr>
+            <a:r>
+              <a:rPr kumimoji="0" lang="en-US" altLang="en-US" sz="1300" b="0" i="0" u="none" strike="noStrike" cap="none" normalizeH="0" baseline="0">
+                <a:ln>
+                  <a:noFill/>
+                </a:ln>
+                <a:solidFill>
+                  <a:schemeClr val="tx1"/>
+                </a:solidFill>
+                <a:effectLst/>
+                <a:latin typeface="Arial" panose="020B0604020202020204" pitchFamily="34" charset="0"/>
+              </a:rPr>
+              <a:t>Nullable statusu dəyişmək və s.</a:t>
+            </a:r>
+          </a:p>
+          <a:p>
+            <a:pPr>
+              <a:lnSpc>
+                <a:spcPct val="150000"/>
+              </a:lnSpc>
+              <a:buNone/>
+            </a:pPr>
+            <a:endParaRPr kumimoji="0" lang="en-US" altLang="en-US" sz="1300" b="0" i="0" u="none" strike="noStrike" cap="none" normalizeH="0" baseline="0">
+              <a:ln>
+                <a:noFill/>
+              </a:ln>
+              <a:solidFill>
+                <a:schemeClr val="tx1"/>
+              </a:solidFill>
+              <a:effectLst/>
+              <a:latin typeface="Arial" panose="020B0604020202020204" pitchFamily="34" charset="0"/>
+            </a:endParaRPr>
+          </a:p>
+          <a:p>
+            <a:pPr>
+              <a:lnSpc>
+                <a:spcPct val="150000"/>
+              </a:lnSpc>
+              <a:buNone/>
+            </a:pPr>
+            <a:r>
+              <a:rPr kumimoji="0" lang="en-US" altLang="en-US" sz="1300" b="1" i="0" u="none" strike="noStrike" cap="none" normalizeH="0" baseline="0">
+                <a:ln>
+                  <a:noFill/>
+                </a:ln>
+                <a:solidFill>
+                  <a:schemeClr val="tx1"/>
+                </a:solidFill>
+                <a:effectLst/>
+                <a:latin typeface="Arial" panose="020B0604020202020204" pitchFamily="34" charset="0"/>
+              </a:rPr>
+              <a:t>Məsələn</a:t>
+            </a:r>
+            <a:r>
+              <a:rPr kumimoji="0" lang="en-US" altLang="en-US" sz="1300" b="0" i="0" u="none" strike="noStrike" cap="none" normalizeH="0" baseline="0">
+                <a:ln>
+                  <a:noFill/>
+                </a:ln>
+                <a:solidFill>
+                  <a:schemeClr val="tx1"/>
+                </a:solidFill>
+                <a:effectLst/>
+                <a:latin typeface="Arial" panose="020B0604020202020204" pitchFamily="34" charset="0"/>
+              </a:rPr>
+              <a:t>:</a:t>
+            </a:r>
+          </a:p>
+          <a:p>
+            <a:pPr>
+              <a:lnSpc>
+                <a:spcPct val="150000"/>
+              </a:lnSpc>
+              <a:buNone/>
+            </a:pPr>
+            <a:r>
+              <a:rPr kumimoji="0" lang="en-US" altLang="en-US" sz="1300" b="0" i="0" u="none" strike="noStrike" cap="none" normalizeH="0" baseline="0">
+                <a:ln>
+                  <a:noFill/>
+                </a:ln>
+                <a:solidFill>
+                  <a:schemeClr val="tx1"/>
+                </a:solidFill>
+                <a:effectLst/>
+                <a:latin typeface="Arial" panose="020B0604020202020204" pitchFamily="34" charset="0"/>
+              </a:rPr>
+              <a:t>`</a:t>
+            </a:r>
+            <a:r>
+              <a:rPr kumimoji="0" lang="en-US" altLang="en-US" sz="1300" b="1" i="0" u="none" strike="noStrike" cap="none" normalizeH="0" baseline="0">
+                <a:ln>
+                  <a:noFill/>
+                </a:ln>
+                <a:solidFill>
+                  <a:srgbClr val="0070C0"/>
+                </a:solidFill>
+                <a:effectLst/>
+                <a:latin typeface="Arial" panose="020B0604020202020204" pitchFamily="34" charset="0"/>
+              </a:rPr>
+              <a:t>publish_date</a:t>
+            </a:r>
+            <a:r>
+              <a:rPr kumimoji="0" lang="en-US" altLang="en-US" sz="1300" b="0" i="0" u="none" strike="noStrike" cap="none" normalizeH="0" baseline="0">
+                <a:ln>
+                  <a:noFill/>
+                </a:ln>
+                <a:solidFill>
+                  <a:schemeClr val="tx1"/>
+                </a:solidFill>
+                <a:effectLst/>
+                <a:latin typeface="Arial" panose="020B0604020202020204" pitchFamily="34" charset="0"/>
+              </a:rPr>
+              <a:t>` və `</a:t>
+            </a:r>
+            <a:r>
+              <a:rPr kumimoji="0" lang="en-US" altLang="en-US" sz="1300" b="1" i="0" u="none" strike="noStrike" cap="none" normalizeH="0" baseline="0">
+                <a:ln>
+                  <a:noFill/>
+                </a:ln>
+                <a:solidFill>
+                  <a:srgbClr val="0070C0"/>
+                </a:solidFill>
+                <a:effectLst/>
+                <a:latin typeface="Arial" panose="020B0604020202020204" pitchFamily="34" charset="0"/>
+              </a:rPr>
+              <a:t>user_id</a:t>
+            </a:r>
+            <a:r>
+              <a:rPr kumimoji="0" lang="en-US" altLang="en-US" sz="1300" b="0" i="0" u="none" strike="noStrike" cap="none" normalizeH="0" baseline="0">
+                <a:ln>
+                  <a:noFill/>
+                </a:ln>
+                <a:solidFill>
+                  <a:schemeClr val="tx1"/>
+                </a:solidFill>
+                <a:effectLst/>
+                <a:latin typeface="Arial" panose="020B0604020202020204" pitchFamily="34" charset="0"/>
+              </a:rPr>
+              <a:t>` adlı </a:t>
+            </a:r>
+            <a:r>
+              <a:rPr kumimoji="0" lang="en-US" altLang="en-US" sz="1300" b="1" i="0" u="none" strike="noStrike" cap="none" normalizeH="0" baseline="0">
+                <a:ln>
+                  <a:noFill/>
+                </a:ln>
+                <a:solidFill>
+                  <a:schemeClr val="tx1"/>
+                </a:solidFill>
+                <a:effectLst/>
+                <a:latin typeface="Arial" panose="020B0604020202020204" pitchFamily="34" charset="0"/>
+              </a:rPr>
+              <a:t>iki sütun əlavə etmək </a:t>
+            </a:r>
+            <a:r>
+              <a:rPr kumimoji="0" lang="en-US" altLang="en-US" sz="1300" b="0" i="0" u="none" strike="noStrike" cap="none" normalizeH="0" baseline="0">
+                <a:ln>
+                  <a:noFill/>
+                </a:ln>
+                <a:solidFill>
+                  <a:schemeClr val="tx1"/>
+                </a:solidFill>
+                <a:effectLst/>
+                <a:latin typeface="Arial" panose="020B0604020202020204" pitchFamily="34" charset="0"/>
+              </a:rPr>
+              <a:t>istəyirsinizsə, </a:t>
+            </a:r>
+          </a:p>
+          <a:p>
+            <a:pPr>
+              <a:lnSpc>
+                <a:spcPct val="150000"/>
+              </a:lnSpc>
+              <a:buNone/>
+            </a:pPr>
+            <a:r>
+              <a:rPr kumimoji="0" lang="en-US" altLang="en-US" sz="1300" b="0" i="0" u="none" strike="noStrike" cap="none" normalizeH="0" baseline="0">
+                <a:ln>
+                  <a:noFill/>
+                </a:ln>
+                <a:solidFill>
+                  <a:schemeClr val="tx1"/>
+                </a:solidFill>
+                <a:effectLst/>
+                <a:latin typeface="Arial" panose="020B0604020202020204" pitchFamily="34" charset="0"/>
+              </a:rPr>
+              <a:t>bu migration sizə uyğun olacaq.</a:t>
+            </a:r>
+          </a:p>
+        </p:txBody>
+      </p:sp>
+      <p:pic>
+        <p:nvPicPr>
+          <p:cNvPr id="4" name="Picture 3">
+            <a:extLst>
+              <a:ext uri="{FF2B5EF4-FFF2-40B4-BE49-F238E27FC236}">
+                <a16:creationId xmlns:a16="http://schemas.microsoft.com/office/drawing/2014/main" id="{CC164B49-4385-C5D0-4F2E-41CAAF9C4009}"/>
+              </a:ext>
+            </a:extLst>
+          </p:cNvPr>
+          <p:cNvPicPr>
+            <a:picLocks noChangeAspect="1"/>
+          </p:cNvPicPr>
+          <p:nvPr/>
+        </p:nvPicPr>
+        <p:blipFill>
+          <a:blip r:embed="rId2">
+            <a:extLst>
+              <a:ext uri="{28A0092B-C50C-407E-A947-70E740481C1C}">
+                <a14:useLocalDpi xmlns:a14="http://schemas.microsoft.com/office/drawing/2010/main" val="0"/>
+              </a:ext>
+            </a:extLst>
+          </a:blip>
+          <a:stretch>
+            <a:fillRect/>
+          </a:stretch>
+        </p:blipFill>
+        <p:spPr>
+          <a:xfrm>
+            <a:off x="5553025" y="3035432"/>
+            <a:ext cx="6638975" cy="3822568"/>
+          </a:xfrm>
+          <a:prstGeom prst="rect">
+            <a:avLst/>
+          </a:prstGeom>
+        </p:spPr>
+      </p:pic>
+    </p:spTree>
+    <p:extLst>
+      <p:ext uri="{BB962C8B-B14F-4D97-AF65-F5344CB8AC3E}">
+        <p14:creationId xmlns:p14="http://schemas.microsoft.com/office/powerpoint/2010/main" val="1186759978"/>
+      </p:ext>
+    </p:extLst>
+  </p:cSld>
+  <p:clrMapOvr>
+    <a:masterClrMapping/>
+  </p:clrMapOvr>
+</p:sld>
+</file>
+
+<file path=ppt/slides/slide3.xml><?xml version="1.0" encoding="utf-8"?>
+<p:sld xmlns:a="http://schemas.openxmlformats.org/drawingml/2006/main" xmlns:r="http://schemas.openxmlformats.org/officeDocument/2006/relationships" xmlns:p="http://schemas.openxmlformats.org/presentationml/2006/main">
+  <p:cSld>
+    <p:spTree>
+      <p:nvGrpSpPr>
+        <p:cNvPr id="1" name="">
+          <a:extLst>
+            <a:ext uri="{FF2B5EF4-FFF2-40B4-BE49-F238E27FC236}">
+              <a16:creationId xmlns:a16="http://schemas.microsoft.com/office/drawing/2014/main" id="{C9DC18D9-B6E1-0A26-F46F-232E92E9C38B}"/>
+            </a:ext>
+          </a:extLst>
+        </p:cNvPr>
+        <p:cNvGrpSpPr/>
+        <p:nvPr/>
+      </p:nvGrpSpPr>
+      <p:grpSpPr>
+        <a:xfrm>
+          <a:off x="0" y="0"/>
+          <a:ext cx="0" cy="0"/>
+          <a:chOff x="0" y="0"/>
+          <a:chExt cx="0" cy="0"/>
+        </a:xfrm>
+      </p:grpSpPr>
+      <p:sp>
+        <p:nvSpPr>
+          <p:cNvPr id="3" name="TextBox 2">
+            <a:extLst>
+              <a:ext uri="{FF2B5EF4-FFF2-40B4-BE49-F238E27FC236}">
+                <a16:creationId xmlns:a16="http://schemas.microsoft.com/office/drawing/2014/main" id="{52BC55BC-AA9F-4369-2742-66A6FCBC65D2}"/>
+              </a:ext>
+            </a:extLst>
+          </p:cNvPr>
+          <p:cNvSpPr txBox="1"/>
+          <p:nvPr/>
+        </p:nvSpPr>
+        <p:spPr>
+          <a:xfrm>
+            <a:off x="217714" y="255046"/>
             <a:ext cx="11756571" cy="355354"/>
           </a:xfrm>
           <a:prstGeom prst="rect">
@@ -3469,10 +4399,132 @@
           </a:p>
         </p:txBody>
       </p:sp>
+      <p:pic>
+        <p:nvPicPr>
+          <p:cNvPr id="4" name="Picture 3">
+            <a:extLst>
+              <a:ext uri="{FF2B5EF4-FFF2-40B4-BE49-F238E27FC236}">
+                <a16:creationId xmlns:a16="http://schemas.microsoft.com/office/drawing/2014/main" id="{F7243BD9-684B-D094-DE40-E9F78F43868C}"/>
+              </a:ext>
+            </a:extLst>
+          </p:cNvPr>
+          <p:cNvPicPr>
+            <a:picLocks noChangeAspect="1"/>
+          </p:cNvPicPr>
+          <p:nvPr/>
+        </p:nvPicPr>
+        <p:blipFill>
+          <a:blip r:embed="rId2">
+            <a:extLst>
+              <a:ext uri="{28A0092B-C50C-407E-A947-70E740481C1C}">
+                <a14:useLocalDpi xmlns:a14="http://schemas.microsoft.com/office/drawing/2010/main" val="0"/>
+              </a:ext>
+            </a:extLst>
+          </a:blip>
+          <a:stretch>
+            <a:fillRect/>
+          </a:stretch>
+        </p:blipFill>
+        <p:spPr>
+          <a:xfrm>
+            <a:off x="0" y="255046"/>
+            <a:ext cx="12192000" cy="6589343"/>
+          </a:xfrm>
+          <a:prstGeom prst="rect">
+            <a:avLst/>
+          </a:prstGeom>
+        </p:spPr>
+      </p:pic>
     </p:spTree>
     <p:extLst>
       <p:ext uri="{BB962C8B-B14F-4D97-AF65-F5344CB8AC3E}">
-        <p14:creationId xmlns:p14="http://schemas.microsoft.com/office/powerpoint/2010/main" val="1186759978"/>
+        <p14:creationId xmlns:p14="http://schemas.microsoft.com/office/powerpoint/2010/main" val="3476330548"/>
+      </p:ext>
+    </p:extLst>
+  </p:cSld>
+  <p:clrMapOvr>
+    <a:masterClrMapping/>
+  </p:clrMapOvr>
+</p:sld>
+</file>
+
+<file path=ppt/slides/slide4.xml><?xml version="1.0" encoding="utf-8"?>
+<p:sld xmlns:a="http://schemas.openxmlformats.org/drawingml/2006/main" xmlns:r="http://schemas.openxmlformats.org/officeDocument/2006/relationships" xmlns:p="http://schemas.openxmlformats.org/presentationml/2006/main">
+  <p:cSld>
+    <p:spTree>
+      <p:nvGrpSpPr>
+        <p:cNvPr id="1" name="">
+          <a:extLst>
+            <a:ext uri="{FF2B5EF4-FFF2-40B4-BE49-F238E27FC236}">
+              <a16:creationId xmlns:a16="http://schemas.microsoft.com/office/drawing/2014/main" id="{0A77E675-68FE-5FA8-9C86-BBFBFC91F2E4}"/>
+            </a:ext>
+          </a:extLst>
+        </p:cNvPr>
+        <p:cNvGrpSpPr/>
+        <p:nvPr/>
+      </p:nvGrpSpPr>
+      <p:grpSpPr>
+        <a:xfrm>
+          <a:off x="0" y="0"/>
+          <a:ext cx="0" cy="0"/>
+          <a:chOff x="0" y="0"/>
+          <a:chExt cx="0" cy="0"/>
+        </a:xfrm>
+      </p:grpSpPr>
+      <p:sp>
+        <p:nvSpPr>
+          <p:cNvPr id="3" name="TextBox 2">
+            <a:extLst>
+              <a:ext uri="{FF2B5EF4-FFF2-40B4-BE49-F238E27FC236}">
+                <a16:creationId xmlns:a16="http://schemas.microsoft.com/office/drawing/2014/main" id="{0FD0ACAD-AA9A-F329-05C6-674140B83CED}"/>
+              </a:ext>
+            </a:extLst>
+          </p:cNvPr>
+          <p:cNvSpPr txBox="1"/>
+          <p:nvPr/>
+        </p:nvSpPr>
+        <p:spPr>
+          <a:xfrm>
+            <a:off x="217714" y="255046"/>
+            <a:ext cx="11756571" cy="355354"/>
+          </a:xfrm>
+          <a:prstGeom prst="rect">
+            <a:avLst/>
+          </a:prstGeom>
+          <a:noFill/>
+        </p:spPr>
+        <p:txBody>
+          <a:bodyPr wrap="square">
+            <a:spAutoFit/>
+          </a:bodyPr>
+          <a:lstStyle/>
+          <a:p>
+            <a:pPr>
+              <a:lnSpc>
+                <a:spcPct val="150000"/>
+              </a:lnSpc>
+              <a:buNone/>
+            </a:pPr>
+            <a:r>
+              <a:rPr kumimoji="0" lang="en-US" altLang="en-US" sz="1300" b="0" i="0" u="none" strike="noStrike" cap="none" normalizeH="0" baseline="0">
+                <a:ln>
+                  <a:noFill/>
+                </a:ln>
+                <a:solidFill>
+                  <a:schemeClr val="tx1"/>
+                </a:solidFill>
+                <a:effectLst/>
+                <a:latin typeface="Arial" panose="020B0604020202020204" pitchFamily="34" charset="0"/>
+              </a:rPr>
+              <a:t>.</a:t>
+            </a:r>
+          </a:p>
+        </p:txBody>
+      </p:sp>
+    </p:spTree>
+    <p:extLst>
+      <p:ext uri="{BB962C8B-B14F-4D97-AF65-F5344CB8AC3E}">
+        <p14:creationId xmlns:p14="http://schemas.microsoft.com/office/powerpoint/2010/main" val="1321653108"/>
       </p:ext>
     </p:extLst>
   </p:cSld>

</xml_diff>